<commit_message>
Update Presentation power point
</commit_message>
<xml_diff>
--- a/Presentation1.pptx
+++ b/Presentation1.pptx
@@ -9,7 +9,10 @@
     <p:sldId id="257" r:id="rId3"/>
     <p:sldId id="258" r:id="rId4"/>
     <p:sldId id="259" r:id="rId5"/>
-    <p:sldId id="260" r:id="rId6"/>
+    <p:sldId id="261" r:id="rId6"/>
+    <p:sldId id="262" r:id="rId7"/>
+    <p:sldId id="263" r:id="rId8"/>
+    <p:sldId id="260" r:id="rId9"/>
   </p:sldIdLst>
   <p:sldSz cx="10058400" cy="5668963"/>
   <p:notesSz cx="6858000" cy="9144000"/>
@@ -292,7 +295,7 @@
           <a:p>
             <a:fld id="{595594B4-983E-461F-8BD7-98DF393EA746}" type="datetimeFigureOut">
               <a:rPr lang="en-US" smtClean="0"/>
-              <a:t>6/8/2023</a:t>
+              <a:t>6/17/2023</a:t>
             </a:fld>
             <a:endParaRPr lang="en-US"/>
           </a:p>
@@ -462,7 +465,7 @@
           <a:p>
             <a:fld id="{595594B4-983E-461F-8BD7-98DF393EA746}" type="datetimeFigureOut">
               <a:rPr lang="en-US" smtClean="0"/>
-              <a:t>6/8/2023</a:t>
+              <a:t>6/17/2023</a:t>
             </a:fld>
             <a:endParaRPr lang="en-US"/>
           </a:p>
@@ -642,7 +645,7 @@
           <a:p>
             <a:fld id="{595594B4-983E-461F-8BD7-98DF393EA746}" type="datetimeFigureOut">
               <a:rPr lang="en-US" smtClean="0"/>
-              <a:t>6/8/2023</a:t>
+              <a:t>6/17/2023</a:t>
             </a:fld>
             <a:endParaRPr lang="en-US"/>
           </a:p>
@@ -812,7 +815,7 @@
           <a:p>
             <a:fld id="{595594B4-983E-461F-8BD7-98DF393EA746}" type="datetimeFigureOut">
               <a:rPr lang="en-US" smtClean="0"/>
-              <a:t>6/8/2023</a:t>
+              <a:t>6/17/2023</a:t>
             </a:fld>
             <a:endParaRPr lang="en-US"/>
           </a:p>
@@ -1058,7 +1061,7 @@
           <a:p>
             <a:fld id="{595594B4-983E-461F-8BD7-98DF393EA746}" type="datetimeFigureOut">
               <a:rPr lang="en-US" smtClean="0"/>
-              <a:t>6/8/2023</a:t>
+              <a:t>6/17/2023</a:t>
             </a:fld>
             <a:endParaRPr lang="en-US"/>
           </a:p>
@@ -1346,7 +1349,7 @@
           <a:p>
             <a:fld id="{595594B4-983E-461F-8BD7-98DF393EA746}" type="datetimeFigureOut">
               <a:rPr lang="en-US" smtClean="0"/>
-              <a:t>6/8/2023</a:t>
+              <a:t>6/17/2023</a:t>
             </a:fld>
             <a:endParaRPr lang="en-US"/>
           </a:p>
@@ -1768,7 +1771,7 @@
           <a:p>
             <a:fld id="{595594B4-983E-461F-8BD7-98DF393EA746}" type="datetimeFigureOut">
               <a:rPr lang="en-US" smtClean="0"/>
-              <a:t>6/8/2023</a:t>
+              <a:t>6/17/2023</a:t>
             </a:fld>
             <a:endParaRPr lang="en-US"/>
           </a:p>
@@ -1886,7 +1889,7 @@
           <a:p>
             <a:fld id="{595594B4-983E-461F-8BD7-98DF393EA746}" type="datetimeFigureOut">
               <a:rPr lang="en-US" smtClean="0"/>
-              <a:t>6/8/2023</a:t>
+              <a:t>6/17/2023</a:t>
             </a:fld>
             <a:endParaRPr lang="en-US"/>
           </a:p>
@@ -1981,7 +1984,7 @@
           <a:p>
             <a:fld id="{595594B4-983E-461F-8BD7-98DF393EA746}" type="datetimeFigureOut">
               <a:rPr lang="en-US" smtClean="0"/>
-              <a:t>6/8/2023</a:t>
+              <a:t>6/17/2023</a:t>
             </a:fld>
             <a:endParaRPr lang="en-US"/>
           </a:p>
@@ -2258,7 +2261,7 @@
           <a:p>
             <a:fld id="{595594B4-983E-461F-8BD7-98DF393EA746}" type="datetimeFigureOut">
               <a:rPr lang="en-US" smtClean="0"/>
-              <a:t>6/8/2023</a:t>
+              <a:t>6/17/2023</a:t>
             </a:fld>
             <a:endParaRPr lang="en-US"/>
           </a:p>
@@ -2511,7 +2514,7 @@
           <a:p>
             <a:fld id="{595594B4-983E-461F-8BD7-98DF393EA746}" type="datetimeFigureOut">
               <a:rPr lang="en-US" smtClean="0"/>
-              <a:t>6/8/2023</a:t>
+              <a:t>6/17/2023</a:t>
             </a:fld>
             <a:endParaRPr lang="en-US"/>
           </a:p>
@@ -2724,7 +2727,7 @@
           <a:p>
             <a:fld id="{595594B4-983E-461F-8BD7-98DF393EA746}" type="datetimeFigureOut">
               <a:rPr lang="en-US" smtClean="0"/>
-              <a:t>6/8/2023</a:t>
+              <a:t>6/17/2023</a:t>
             </a:fld>
             <a:endParaRPr lang="en-US"/>
           </a:p>
@@ -3448,7 +3451,7 @@
     </p:spTree>
     <p:extLst>
       <p:ext uri="{BB962C8B-B14F-4D97-AF65-F5344CB8AC3E}">
-        <p14:creationId xmlns:p14="http://schemas.microsoft.com/office/powerpoint/2010/main" val="999874890"/>
+        <p14:creationId xmlns:p14="http://schemas.microsoft.com/office/powerpoint/2010/main" val="881779836"/>
       </p:ext>
     </p:extLst>
   </p:cSld>
@@ -3457,11 +3460,248 @@
   </p:clrMapOvr>
   <mc:AlternateContent xmlns:mc="http://schemas.openxmlformats.org/markup-compatibility/2006">
     <mc:Choice xmlns:p14="http://schemas.microsoft.com/office/powerpoint/2010/main" Requires="p14">
+      <p:transition spd="slow" p14:dur="1600">
+        <p14:prism isContent="1" isInverted="1"/>
+      </p:transition>
+    </mc:Choice>
+    <mc:Fallback>
+      <p:transition spd="slow">
+        <p:fade/>
+      </p:transition>
+    </mc:Fallback>
+  </mc:AlternateContent>
+  <p:timing>
+    <p:tnLst>
+      <p:par>
+        <p:cTn id="1" dur="indefinite" restart="never" nodeType="tmRoot"/>
+      </p:par>
+    </p:tnLst>
+  </p:timing>
+</p:sld>
+</file>
+
+<file path=ppt/slides/slide6.xml><?xml version="1.0" encoding="utf-8"?>
+<p:sld xmlns:a="http://schemas.openxmlformats.org/drawingml/2006/main" xmlns:r="http://schemas.openxmlformats.org/officeDocument/2006/relationships" xmlns:p="http://schemas.openxmlformats.org/presentationml/2006/main">
+  <p:cSld>
+    <p:spTree>
+      <p:nvGrpSpPr>
+        <p:cNvPr id="1" name=""/>
+        <p:cNvGrpSpPr/>
+        <p:nvPr/>
+      </p:nvGrpSpPr>
+      <p:grpSpPr>
+        <a:xfrm>
+          <a:off x="0" y="0"/>
+          <a:ext cx="0" cy="0"/>
+          <a:chOff x="0" y="0"/>
+          <a:chExt cx="0" cy="0"/>
+        </a:xfrm>
+      </p:grpSpPr>
+      <p:pic>
+        <p:nvPicPr>
+          <p:cNvPr id="2" name="Picture 1"/>
+          <p:cNvPicPr>
+            <a:picLocks noChangeAspect="1"/>
+          </p:cNvPicPr>
+          <p:nvPr/>
+        </p:nvPicPr>
+        <p:blipFill>
+          <a:blip r:embed="rId2">
+            <a:extLst>
+              <a:ext uri="{28A0092B-C50C-407E-A947-70E740481C1C}">
+                <a14:useLocalDpi xmlns:a14="http://schemas.microsoft.com/office/drawing/2010/main" val="0"/>
+              </a:ext>
+            </a:extLst>
+          </a:blip>
+          <a:stretch>
+            <a:fillRect/>
+          </a:stretch>
+        </p:blipFill>
+        <p:spPr>
+          <a:xfrm>
+            <a:off x="0" y="5556"/>
+            <a:ext cx="10058400" cy="5657850"/>
+          </a:xfrm>
+          <a:prstGeom prst="rect">
+            <a:avLst/>
+          </a:prstGeom>
+        </p:spPr>
+      </p:pic>
+    </p:spTree>
+    <p:extLst>
+      <p:ext uri="{BB962C8B-B14F-4D97-AF65-F5344CB8AC3E}">
+        <p14:creationId xmlns:p14="http://schemas.microsoft.com/office/powerpoint/2010/main" val="663177418"/>
+      </p:ext>
+    </p:extLst>
+  </p:cSld>
+  <p:clrMapOvr>
+    <a:masterClrMapping/>
+  </p:clrMapOvr>
+  <mc:AlternateContent xmlns:mc="http://schemas.openxmlformats.org/markup-compatibility/2006">
+    <mc:Choice xmlns:p14="http://schemas.microsoft.com/office/powerpoint/2010/main" Requires="p14">
+      <p:transition spd="slow" p14:dur="2500">
+        <p:checker/>
+      </p:transition>
+    </mc:Choice>
+    <mc:Fallback>
+      <p:transition spd="slow">
+        <p:checker/>
+      </p:transition>
+    </mc:Fallback>
+  </mc:AlternateContent>
+  <p:timing>
+    <p:tnLst>
+      <p:par>
+        <p:cTn id="1" dur="indefinite" restart="never" nodeType="tmRoot"/>
+      </p:par>
+    </p:tnLst>
+  </p:timing>
+</p:sld>
+</file>
+
+<file path=ppt/slides/slide7.xml><?xml version="1.0" encoding="utf-8"?>
+<p:sld xmlns:a="http://schemas.openxmlformats.org/drawingml/2006/main" xmlns:r="http://schemas.openxmlformats.org/officeDocument/2006/relationships" xmlns:p="http://schemas.openxmlformats.org/presentationml/2006/main">
+  <p:cSld>
+    <p:spTree>
+      <p:nvGrpSpPr>
+        <p:cNvPr id="1" name=""/>
+        <p:cNvGrpSpPr/>
+        <p:nvPr/>
+      </p:nvGrpSpPr>
+      <p:grpSpPr>
+        <a:xfrm>
+          <a:off x="0" y="0"/>
+          <a:ext cx="0" cy="0"/>
+          <a:chOff x="0" y="0"/>
+          <a:chExt cx="0" cy="0"/>
+        </a:xfrm>
+      </p:grpSpPr>
+      <p:pic>
+        <p:nvPicPr>
+          <p:cNvPr id="2" name="Picture 1"/>
+          <p:cNvPicPr>
+            <a:picLocks noChangeAspect="1"/>
+          </p:cNvPicPr>
+          <p:nvPr/>
+        </p:nvPicPr>
+        <p:blipFill>
+          <a:blip r:embed="rId2">
+            <a:extLst>
+              <a:ext uri="{28A0092B-C50C-407E-A947-70E740481C1C}">
+                <a14:useLocalDpi xmlns:a14="http://schemas.microsoft.com/office/drawing/2010/main" val="0"/>
+              </a:ext>
+            </a:extLst>
+          </a:blip>
+          <a:stretch>
+            <a:fillRect/>
+          </a:stretch>
+        </p:blipFill>
+        <p:spPr>
+          <a:xfrm>
+            <a:off x="0" y="5556"/>
+            <a:ext cx="10058400" cy="5657850"/>
+          </a:xfrm>
+          <a:prstGeom prst="rect">
+            <a:avLst/>
+          </a:prstGeom>
+        </p:spPr>
+      </p:pic>
+    </p:spTree>
+    <p:extLst>
+      <p:ext uri="{BB962C8B-B14F-4D97-AF65-F5344CB8AC3E}">
+        <p14:creationId xmlns:p14="http://schemas.microsoft.com/office/powerpoint/2010/main" val="1368834081"/>
+      </p:ext>
+    </p:extLst>
+  </p:cSld>
+  <p:clrMapOvr>
+    <a:masterClrMapping/>
+  </p:clrMapOvr>
+  <mc:AlternateContent xmlns:mc="http://schemas.openxmlformats.org/markup-compatibility/2006">
+    <mc:Choice xmlns:p14="http://schemas.microsoft.com/office/powerpoint/2010/main" Requires="p14">
+      <p:transition spd="slow">
+        <p14:flash/>
+      </p:transition>
+    </mc:Choice>
+    <mc:Fallback>
+      <p:transition spd="slow">
+        <p:fade/>
+      </p:transition>
+    </mc:Fallback>
+  </mc:AlternateContent>
+  <p:timing>
+    <p:tnLst>
+      <p:par>
+        <p:cTn id="1" dur="indefinite" restart="never" nodeType="tmRoot"/>
+      </p:par>
+    </p:tnLst>
+  </p:timing>
+</p:sld>
+</file>
+
+<file path=ppt/slides/slide8.xml><?xml version="1.0" encoding="utf-8"?>
+<p:sld xmlns:a="http://schemas.openxmlformats.org/drawingml/2006/main" xmlns:r="http://schemas.openxmlformats.org/officeDocument/2006/relationships" xmlns:p="http://schemas.openxmlformats.org/presentationml/2006/main">
+  <p:cSld>
+    <p:spTree>
+      <p:nvGrpSpPr>
+        <p:cNvPr id="1" name=""/>
+        <p:cNvGrpSpPr/>
+        <p:nvPr/>
+      </p:nvGrpSpPr>
+      <p:grpSpPr>
+        <a:xfrm>
+          <a:off x="0" y="0"/>
+          <a:ext cx="0" cy="0"/>
+          <a:chOff x="0" y="0"/>
+          <a:chExt cx="0" cy="0"/>
+        </a:xfrm>
+      </p:grpSpPr>
+      <p:pic>
+        <p:nvPicPr>
+          <p:cNvPr id="2" name="Picture 1"/>
+          <p:cNvPicPr>
+            <a:picLocks noChangeAspect="1"/>
+          </p:cNvPicPr>
+          <p:nvPr/>
+        </p:nvPicPr>
+        <p:blipFill>
+          <a:blip r:embed="rId2">
+            <a:extLst>
+              <a:ext uri="{28A0092B-C50C-407E-A947-70E740481C1C}">
+                <a14:useLocalDpi xmlns:a14="http://schemas.microsoft.com/office/drawing/2010/main" val="0"/>
+              </a:ext>
+            </a:extLst>
+          </a:blip>
+          <a:stretch>
+            <a:fillRect/>
+          </a:stretch>
+        </p:blipFill>
+        <p:spPr>
+          <a:xfrm>
+            <a:off x="0" y="5556"/>
+            <a:ext cx="10058400" cy="5657850"/>
+          </a:xfrm>
+          <a:prstGeom prst="rect">
+            <a:avLst/>
+          </a:prstGeom>
+        </p:spPr>
+      </p:pic>
+    </p:spTree>
+    <p:extLst>
+      <p:ext uri="{BB962C8B-B14F-4D97-AF65-F5344CB8AC3E}">
+        <p14:creationId xmlns:p14="http://schemas.microsoft.com/office/powerpoint/2010/main" val="999874890"/>
+      </p:ext>
+    </p:extLst>
+  </p:cSld>
+  <p:clrMapOvr>
+    <a:masterClrMapping/>
+  </p:clrMapOvr>
+  <mc:AlternateContent xmlns:mc="http://schemas.openxmlformats.org/markup-compatibility/2006" xmlns:p14="http://schemas.microsoft.com/office/powerpoint/2010/main">
+    <mc:Choice Requires="p14">
       <p:transition spd="slow" p14:dur="1400">
         <p14:ripple/>
       </p:transition>
     </mc:Choice>
-    <mc:Fallback>
+    <mc:Fallback xmlns="">
       <p:transition spd="slow">
         <p:fade/>
       </p:transition>

</xml_diff>